<commit_message>
Add Joel's changes to diagram + clean
</commit_message>
<xml_diff>
--- a/paper/lritm_box_diagram.pptx
+++ b/paper/lritm_box_diagram.pptx
@@ -104,6 +104,11 @@
       </a:defRPr>
     </a:lvl9pPr>
   </p:defaultTextStyle>
+  <p:extLst>
+    <p:ext uri="{EFAFB233-063F-42B5-8137-9DF3F51BA10A}">
+      <p15:sldGuideLst xmlns:p15="http://schemas.microsoft.com/office/powerpoint/2012/main"/>
+    </p:ext>
+  </p:extLst>
 </p:presentation>
 </file>
 
@@ -256,7 +261,7 @@
           <a:p>
             <a:fld id="{20086B1B-ED8E-4CD8-BF5B-118FFDC93646}" type="datetimeFigureOut">
               <a:rPr lang="en-GB" smtClean="0"/>
-              <a:t>09/06/2019</a:t>
+              <a:t>16/02/2020</a:t>
             </a:fld>
             <a:endParaRPr lang="en-GB"/>
           </a:p>
@@ -456,7 +461,7 @@
           <a:p>
             <a:fld id="{20086B1B-ED8E-4CD8-BF5B-118FFDC93646}" type="datetimeFigureOut">
               <a:rPr lang="en-GB" smtClean="0"/>
-              <a:t>09/06/2019</a:t>
+              <a:t>16/02/2020</a:t>
             </a:fld>
             <a:endParaRPr lang="en-GB"/>
           </a:p>
@@ -666,7 +671,7 @@
           <a:p>
             <a:fld id="{20086B1B-ED8E-4CD8-BF5B-118FFDC93646}" type="datetimeFigureOut">
               <a:rPr lang="en-GB" smtClean="0"/>
-              <a:t>09/06/2019</a:t>
+              <a:t>16/02/2020</a:t>
             </a:fld>
             <a:endParaRPr lang="en-GB"/>
           </a:p>
@@ -866,7 +871,7 @@
           <a:p>
             <a:fld id="{20086B1B-ED8E-4CD8-BF5B-118FFDC93646}" type="datetimeFigureOut">
               <a:rPr lang="en-GB" smtClean="0"/>
-              <a:t>09/06/2019</a:t>
+              <a:t>16/02/2020</a:t>
             </a:fld>
             <a:endParaRPr lang="en-GB"/>
           </a:p>
@@ -1142,7 +1147,7 @@
           <a:p>
             <a:fld id="{20086B1B-ED8E-4CD8-BF5B-118FFDC93646}" type="datetimeFigureOut">
               <a:rPr lang="en-GB" smtClean="0"/>
-              <a:t>09/06/2019</a:t>
+              <a:t>16/02/2020</a:t>
             </a:fld>
             <a:endParaRPr lang="en-GB"/>
           </a:p>
@@ -1410,7 +1415,7 @@
           <a:p>
             <a:fld id="{20086B1B-ED8E-4CD8-BF5B-118FFDC93646}" type="datetimeFigureOut">
               <a:rPr lang="en-GB" smtClean="0"/>
-              <a:t>09/06/2019</a:t>
+              <a:t>16/02/2020</a:t>
             </a:fld>
             <a:endParaRPr lang="en-GB"/>
           </a:p>
@@ -1825,7 +1830,7 @@
           <a:p>
             <a:fld id="{20086B1B-ED8E-4CD8-BF5B-118FFDC93646}" type="datetimeFigureOut">
               <a:rPr lang="en-GB" smtClean="0"/>
-              <a:t>09/06/2019</a:t>
+              <a:t>16/02/2020</a:t>
             </a:fld>
             <a:endParaRPr lang="en-GB"/>
           </a:p>
@@ -1967,7 +1972,7 @@
           <a:p>
             <a:fld id="{20086B1B-ED8E-4CD8-BF5B-118FFDC93646}" type="datetimeFigureOut">
               <a:rPr lang="en-GB" smtClean="0"/>
-              <a:t>09/06/2019</a:t>
+              <a:t>16/02/2020</a:t>
             </a:fld>
             <a:endParaRPr lang="en-GB"/>
           </a:p>
@@ -2080,7 +2085,7 @@
           <a:p>
             <a:fld id="{20086B1B-ED8E-4CD8-BF5B-118FFDC93646}" type="datetimeFigureOut">
               <a:rPr lang="en-GB" smtClean="0"/>
-              <a:t>09/06/2019</a:t>
+              <a:t>16/02/2020</a:t>
             </a:fld>
             <a:endParaRPr lang="en-GB"/>
           </a:p>
@@ -2393,7 +2398,7 @@
           <a:p>
             <a:fld id="{20086B1B-ED8E-4CD8-BF5B-118FFDC93646}" type="datetimeFigureOut">
               <a:rPr lang="en-GB" smtClean="0"/>
-              <a:t>09/06/2019</a:t>
+              <a:t>16/02/2020</a:t>
             </a:fld>
             <a:endParaRPr lang="en-GB"/>
           </a:p>
@@ -2682,7 +2687,7 @@
           <a:p>
             <a:fld id="{20086B1B-ED8E-4CD8-BF5B-118FFDC93646}" type="datetimeFigureOut">
               <a:rPr lang="en-GB" smtClean="0"/>
-              <a:t>09/06/2019</a:t>
+              <a:t>16/02/2020</a:t>
             </a:fld>
             <a:endParaRPr lang="en-GB"/>
           </a:p>
@@ -2925,7 +2930,7 @@
           <a:p>
             <a:fld id="{20086B1B-ED8E-4CD8-BF5B-118FFDC93646}" type="datetimeFigureOut">
               <a:rPr lang="en-GB" smtClean="0"/>
-              <a:t>09/06/2019</a:t>
+              <a:t>16/02/2020</a:t>
             </a:fld>
             <a:endParaRPr lang="en-GB"/>
           </a:p>
@@ -3372,13 +3377,17 @@
           <a:p>
             <a:pPr algn="ctr"/>
             <a:r>
-              <a:rPr lang="en-US" sz="1200" dirty="0"/>
-              <a:t>5) </a:t>
-            </a:r>
-            <a:r>
               <a:rPr lang="en-US" sz="1200" b="1" dirty="0" err="1"/>
               <a:t>Mdp</a:t>
             </a:r>
+            <a:r>
+              <a:rPr lang="en-US" sz="1200" b="1" dirty="0"/>
+              <a:t>: </a:t>
+            </a:r>
+            <a:r>
+              <a:rPr lang="en-US" sz="1200" dirty="0"/>
+              <a:t>-1 select P2P, 1 selects area mode, 0 continues area mode</a:t>
+            </a:r>
             <a:endParaRPr lang="en-GB" sz="1200" dirty="0"/>
           </a:p>
         </p:txBody>
@@ -3397,8 +3406,8 @@
         </p:nvSpPr>
         <p:spPr>
           <a:xfrm>
-            <a:off x="3765549" y="415879"/>
-            <a:ext cx="1137920" cy="426720"/>
+            <a:off x="3956368" y="406590"/>
+            <a:ext cx="922516" cy="426720"/>
           </a:xfrm>
           <a:prstGeom prst="rect">
             <a:avLst/>
@@ -3411,9 +3420,10 @@
           </a:bodyPr>
           <a:lstStyle/>
           <a:p>
+            <a:pPr algn="ctr"/>
             <a:r>
               <a:rPr lang="en-US" sz="1200" dirty="0"/>
-              <a:t>6) Secondary parameters</a:t>
+              <a:t>Secondary parameters</a:t>
             </a:r>
             <a:endParaRPr lang="en-GB" sz="1200" dirty="0"/>
           </a:p>
@@ -3433,7 +3443,7 @@
         </p:nvSpPr>
         <p:spPr>
           <a:xfrm>
-            <a:off x="4765041" y="427815"/>
+            <a:off x="4892067" y="409000"/>
             <a:ext cx="1117600" cy="426720"/>
           </a:xfrm>
           <a:prstGeom prst="rect">
@@ -3447,9 +3457,10 @@
           </a:bodyPr>
           <a:lstStyle/>
           <a:p>
+            <a:pPr algn="ctr"/>
             <a:r>
               <a:rPr lang="en-US" sz="1200" dirty="0"/>
-              <a:t>7) Check param ranges</a:t>
+              <a:t>Check param ranges</a:t>
             </a:r>
             <a:endParaRPr lang="en-GB" sz="1200" dirty="0"/>
           </a:p>
@@ -3469,7 +3480,7 @@
         </p:nvSpPr>
         <p:spPr>
           <a:xfrm>
-            <a:off x="6021705" y="405922"/>
+            <a:off x="6139205" y="396633"/>
             <a:ext cx="1016000" cy="426720"/>
           </a:xfrm>
           <a:prstGeom prst="rect">
@@ -3483,9 +3494,10 @@
           </a:bodyPr>
           <a:lstStyle/>
           <a:p>
+            <a:pPr algn="ctr"/>
             <a:r>
               <a:rPr lang="en-US" sz="1200" dirty="0"/>
-              <a:t>8) Check distance</a:t>
+              <a:t>Check distance</a:t>
             </a:r>
             <a:endParaRPr lang="en-GB" sz="1200" dirty="0"/>
           </a:p>
@@ -3505,8 +3517,8 @@
         </p:nvSpPr>
         <p:spPr>
           <a:xfrm>
-            <a:off x="7037705" y="405922"/>
-            <a:ext cx="1016000" cy="426720"/>
+            <a:off x="7140916" y="396633"/>
+            <a:ext cx="1107734" cy="426720"/>
           </a:xfrm>
           <a:prstGeom prst="rect">
             <a:avLst/>
@@ -3519,9 +3531,10 @@
           </a:bodyPr>
           <a:lstStyle/>
           <a:p>
+            <a:pPr algn="ctr"/>
             <a:r>
               <a:rPr lang="en-US" sz="1200" dirty="0"/>
-              <a:t>9) Diffraction coefficients</a:t>
+              <a:t>Diffraction coefficients</a:t>
             </a:r>
             <a:endParaRPr lang="en-GB" sz="1200" dirty="0"/>
           </a:p>
@@ -3541,8 +3554,8 @@
         </p:nvSpPr>
         <p:spPr>
           <a:xfrm>
-            <a:off x="3765549" y="954363"/>
-            <a:ext cx="1016000" cy="426720"/>
+            <a:off x="3968149" y="949784"/>
+            <a:ext cx="881955" cy="426720"/>
           </a:xfrm>
           <a:prstGeom prst="rect">
             <a:avLst/>
@@ -3555,10 +3568,7 @@
           </a:bodyPr>
           <a:lstStyle/>
           <a:p>
-            <a:r>
-              <a:rPr lang="en-US" sz="1200" dirty="0"/>
-              <a:t>15) </a:t>
-            </a:r>
+            <a:pPr algn="ctr"/>
             <a:r>
               <a:rPr lang="en-US" sz="1200" dirty="0" err="1"/>
               <a:t>wlos</a:t>
@@ -3581,7 +3591,7 @@
         </p:nvSpPr>
         <p:spPr>
           <a:xfrm>
-            <a:off x="4771389" y="941730"/>
+            <a:off x="4925321" y="967551"/>
             <a:ext cx="1016000" cy="426720"/>
           </a:xfrm>
           <a:prstGeom prst="rect">
@@ -3595,9 +3605,10 @@
           </a:bodyPr>
           <a:lstStyle/>
           <a:p>
+            <a:pPr algn="ctr"/>
             <a:r>
               <a:rPr lang="en-US" sz="1200" dirty="0"/>
-              <a:t>16) Los coefficients</a:t>
+              <a:t>Los coefficients</a:t>
             </a:r>
             <a:endParaRPr lang="en-GB" sz="1200" dirty="0"/>
           </a:p>
@@ -3617,7 +3628,7 @@
         </p:nvSpPr>
         <p:spPr>
           <a:xfrm>
-            <a:off x="6042025" y="984110"/>
+            <a:off x="6134502" y="974887"/>
             <a:ext cx="1016000" cy="426720"/>
           </a:xfrm>
           <a:prstGeom prst="rect">
@@ -3631,9 +3642,10 @@
           </a:bodyPr>
           <a:lstStyle/>
           <a:p>
+            <a:pPr algn="ctr"/>
             <a:r>
               <a:rPr lang="en-US" sz="1200" dirty="0"/>
-              <a:t>20) Topo-scatter</a:t>
+              <a:t>Tropo-scatter</a:t>
             </a:r>
             <a:endParaRPr lang="en-GB" sz="1200" dirty="0"/>
           </a:p>
@@ -3653,8 +3665,8 @@
         </p:nvSpPr>
         <p:spPr>
           <a:xfrm>
-            <a:off x="7058025" y="974888"/>
-            <a:ext cx="1219200" cy="426720"/>
+            <a:off x="7130936" y="974896"/>
+            <a:ext cx="1156015" cy="426720"/>
           </a:xfrm>
           <a:prstGeom prst="rect">
             <a:avLst/>
@@ -3667,13 +3679,10 @@
           </a:bodyPr>
           <a:lstStyle/>
           <a:p>
-            <a:r>
-              <a:rPr lang="en-US" sz="1200" dirty="0"/>
-              <a:t>21) </a:t>
-            </a:r>
+            <a:pPr algn="ctr"/>
             <a:r>
               <a:rPr lang="en-US" sz="1200" dirty="0" err="1"/>
-              <a:t>Toposcatter</a:t>
+              <a:t>Troposcatter</a:t>
             </a:r>
             <a:r>
               <a:rPr lang="en-US" sz="1200" dirty="0"/>
@@ -3713,10 +3722,6 @@
           <a:p>
             <a:pPr algn="ctr"/>
             <a:r>
-              <a:rPr lang="en-US" sz="1200" dirty="0"/>
-              <a:t>4) </a:t>
-            </a:r>
-            <a:r>
               <a:rPr lang="en-US" sz="1200" b="1" dirty="0" err="1"/>
               <a:t>LRprop</a:t>
             </a:r>
@@ -3758,7 +3763,7 @@
         </p:nvSpPr>
         <p:spPr>
           <a:xfrm>
-            <a:off x="9763443" y="1122189"/>
+            <a:off x="9763443" y="1132128"/>
             <a:ext cx="731520" cy="426720"/>
           </a:xfrm>
           <a:prstGeom prst="rect">
@@ -3774,10 +3779,6 @@
           <a:p>
             <a:pPr algn="ctr"/>
             <a:r>
-              <a:rPr lang="en-US" sz="1200" dirty="0"/>
-              <a:t>10) </a:t>
-            </a:r>
-            <a:r>
               <a:rPr lang="en-US" sz="1200" b="1" dirty="0" err="1"/>
               <a:t>adiff</a:t>
             </a:r>
@@ -3799,8 +3800,8 @@
         </p:nvSpPr>
         <p:spPr>
           <a:xfrm>
-            <a:off x="10553383" y="500030"/>
-            <a:ext cx="1218247" cy="426720"/>
+            <a:off x="10552588" y="413485"/>
+            <a:ext cx="1218247" cy="399118"/>
           </a:xfrm>
           <a:prstGeom prst="rect">
             <a:avLst/>
@@ -3813,9 +3814,10 @@
           </a:bodyPr>
           <a:lstStyle/>
           <a:p>
+            <a:pPr algn="ctr"/>
             <a:r>
               <a:rPr lang="en-US" sz="1200" dirty="0"/>
-              <a:t>11) Diffraction constants</a:t>
+              <a:t>Diffraction constants</a:t>
             </a:r>
             <a:endParaRPr lang="en-GB" sz="1200" dirty="0"/>
           </a:p>
@@ -3835,8 +3837,8 @@
         </p:nvSpPr>
         <p:spPr>
           <a:xfrm>
-            <a:off x="10553383" y="1002951"/>
-            <a:ext cx="1218247" cy="426720"/>
+            <a:off x="10560683" y="862371"/>
+            <a:ext cx="1218247" cy="358868"/>
           </a:xfrm>
           <a:prstGeom prst="rect">
             <a:avLst/>
@@ -3849,9 +3851,10 @@
           </a:bodyPr>
           <a:lstStyle/>
           <a:p>
+            <a:pPr algn="ctr"/>
             <a:r>
               <a:rPr lang="en-US" sz="1200" dirty="0"/>
-              <a:t>12) Diffraction attenuation</a:t>
+              <a:t>Diffraction attenuation</a:t>
             </a:r>
             <a:endParaRPr lang="en-GB" sz="1200" dirty="0"/>
           </a:p>
@@ -3871,7 +3874,7 @@
         </p:nvSpPr>
         <p:spPr>
           <a:xfrm>
-            <a:off x="10553383" y="1470315"/>
+            <a:off x="10551547" y="1308200"/>
             <a:ext cx="1236520" cy="426720"/>
           </a:xfrm>
           <a:prstGeom prst="rect">
@@ -3885,15 +3888,20 @@
           </a:bodyPr>
           <a:lstStyle/>
           <a:p>
+            <a:pPr algn="ctr"/>
+            <a:r>
+              <a:rPr lang="en-US" sz="1200" b="1" dirty="0" err="1"/>
+              <a:t>Aknfe</a:t>
+            </a:r>
+            <a:r>
+              <a:rPr lang="en-US" sz="1200" b="1" dirty="0"/>
+              <a:t>: </a:t>
+            </a:r>
             <a:r>
               <a:rPr lang="en-US" sz="1200" dirty="0"/>
-              <a:t>13) </a:t>
-            </a:r>
-            <a:r>
-              <a:rPr lang="en-US" sz="1200" b="1" dirty="0" err="1"/>
-              <a:t>aknfe</a:t>
-            </a:r>
-            <a:endParaRPr lang="en-GB" sz="1200" b="1" dirty="0"/>
+              <a:t>knife edge diffraction</a:t>
+            </a:r>
+            <a:endParaRPr lang="en-GB" sz="1200" dirty="0"/>
           </a:p>
         </p:txBody>
       </p:sp>
@@ -3911,7 +3919,7 @@
         </p:nvSpPr>
         <p:spPr>
           <a:xfrm>
-            <a:off x="10553383" y="1846240"/>
+            <a:off x="10560192" y="1764856"/>
             <a:ext cx="1236520" cy="426720"/>
           </a:xfrm>
           <a:prstGeom prst="rect">
@@ -3925,15 +3933,20 @@
           </a:bodyPr>
           <a:lstStyle/>
           <a:p>
+            <a:pPr algn="ctr"/>
+            <a:r>
+              <a:rPr lang="en-US" sz="1200" b="1" dirty="0" err="1"/>
+              <a:t>Fht</a:t>
+            </a:r>
+            <a:r>
+              <a:rPr lang="en-US" sz="1200" b="1" dirty="0"/>
+              <a:t>: </a:t>
+            </a:r>
             <a:r>
               <a:rPr lang="en-US" sz="1200" dirty="0"/>
-              <a:t>14) </a:t>
-            </a:r>
-            <a:r>
-              <a:rPr lang="en-US" sz="1200" b="1" dirty="0" err="1"/>
-              <a:t>fht</a:t>
-            </a:r>
-            <a:endParaRPr lang="en-GB" sz="1200" b="1" dirty="0"/>
+              <a:t>smooth Earth diffraction</a:t>
+            </a:r>
+            <a:endParaRPr lang="en-GB" sz="1200" dirty="0"/>
           </a:p>
         </p:txBody>
       </p:sp>
@@ -3967,10 +3980,6 @@
           <a:p>
             <a:pPr algn="ctr"/>
             <a:r>
-              <a:rPr lang="en-US" sz="1200" dirty="0"/>
-              <a:t>17) </a:t>
-            </a:r>
-            <a:r>
               <a:rPr lang="en-US" sz="1200" b="1" dirty="0" err="1"/>
               <a:t>alos</a:t>
             </a:r>
@@ -4006,9 +4015,10 @@
           </a:bodyPr>
           <a:lstStyle/>
           <a:p>
+            <a:pPr algn="ctr"/>
             <a:r>
               <a:rPr lang="en-US" sz="1200" dirty="0"/>
-              <a:t>19) Loss attenuation</a:t>
+              <a:t>Loss attenuation</a:t>
             </a:r>
             <a:endParaRPr lang="en-GB" sz="1200" dirty="0"/>
           </a:p>
@@ -4042,9 +4052,10 @@
           </a:bodyPr>
           <a:lstStyle/>
           <a:p>
+            <a:pPr algn="ctr"/>
             <a:r>
               <a:rPr lang="en-US" sz="1200" dirty="0"/>
-              <a:t>18) Loss constants</a:t>
+              <a:t>Loss constants</a:t>
             </a:r>
             <a:endParaRPr lang="en-GB" sz="1200" dirty="0"/>
           </a:p>
@@ -4080,10 +4091,6 @@
           <a:p>
             <a:pPr algn="ctr"/>
             <a:r>
-              <a:rPr lang="en-US" sz="1200" dirty="0"/>
-              <a:t>22) </a:t>
-            </a:r>
-            <a:r>
               <a:rPr lang="en-US" sz="1200" b="1" dirty="0" err="1"/>
               <a:t>ascat</a:t>
             </a:r>
@@ -4105,7 +4112,7 @@
         </p:nvSpPr>
         <p:spPr>
           <a:xfrm>
-            <a:off x="10522425" y="4074442"/>
+            <a:off x="10541631" y="4044521"/>
             <a:ext cx="1256983" cy="473295"/>
           </a:xfrm>
           <a:prstGeom prst="rect">
@@ -4119,9 +4126,10 @@
           </a:bodyPr>
           <a:lstStyle/>
           <a:p>
+            <a:pPr algn="ctr"/>
             <a:r>
               <a:rPr lang="en-US" sz="1200" dirty="0"/>
-              <a:t>23) Scatter constants</a:t>
+              <a:t>Scatter constants</a:t>
             </a:r>
             <a:endParaRPr lang="en-GB" sz="1200" dirty="0"/>
           </a:p>
@@ -4142,7 +4150,7 @@
         <p:spPr>
           <a:xfrm>
             <a:off x="10533221" y="4638542"/>
-            <a:ext cx="1298258" cy="426720"/>
+            <a:ext cx="1245709" cy="426720"/>
           </a:xfrm>
           <a:prstGeom prst="rect">
             <a:avLst/>
@@ -4155,9 +4163,10 @@
           </a:bodyPr>
           <a:lstStyle/>
           <a:p>
+            <a:pPr algn="ctr"/>
             <a:r>
               <a:rPr lang="en-US" sz="1200" dirty="0"/>
-              <a:t>24) Scatter attenuation</a:t>
+              <a:t>Scatter attenuation</a:t>
             </a:r>
             <a:endParaRPr lang="en-GB" sz="1200" dirty="0"/>
           </a:p>
@@ -4191,10 +4200,7 @@
           </a:bodyPr>
           <a:lstStyle/>
           <a:p>
-            <a:r>
-              <a:rPr lang="en-US" sz="1200" dirty="0"/>
-              <a:t>25) </a:t>
-            </a:r>
+            <a:pPr algn="ctr"/>
             <a:r>
               <a:rPr lang="en-US" sz="1200" b="1" dirty="0"/>
               <a:t>h0f</a:t>
@@ -4222,7 +4228,7 @@
         <p:spPr>
           <a:xfrm>
             <a:off x="10544017" y="5683114"/>
-            <a:ext cx="1456688" cy="426720"/>
+            <a:ext cx="1226818" cy="426720"/>
           </a:xfrm>
           <a:prstGeom prst="rect">
             <a:avLst/>
@@ -4235,10 +4241,7 @@
           </a:bodyPr>
           <a:lstStyle/>
           <a:p>
-            <a:r>
-              <a:rPr lang="en-US" sz="1200" dirty="0"/>
-              <a:t>26) </a:t>
-            </a:r>
+            <a:pPr algn="ctr"/>
             <a:r>
               <a:rPr lang="en-US" sz="1200" b="1" dirty="0" err="1"/>
               <a:t>ahd</a:t>
@@ -4477,10 +4480,6 @@
           <a:p>
             <a:pPr algn="ctr"/>
             <a:r>
-              <a:rPr lang="en-US" sz="1200" dirty="0"/>
-              <a:t>27/28) </a:t>
-            </a:r>
-            <a:r>
               <a:rPr lang="en-US" sz="1200" b="1" dirty="0" err="1"/>
               <a:t>avar</a:t>
             </a:r>
@@ -4502,7 +4501,7 @@
         </p:nvSpPr>
         <p:spPr>
           <a:xfrm>
-            <a:off x="4027488" y="5530317"/>
+            <a:off x="4027488" y="5536667"/>
             <a:ext cx="1137920" cy="426720"/>
           </a:xfrm>
           <a:prstGeom prst="rect">
@@ -4516,9 +4515,10 @@
           </a:bodyPr>
           <a:lstStyle/>
           <a:p>
+            <a:pPr algn="ctr"/>
             <a:r>
               <a:rPr lang="en-US" sz="1200" dirty="0"/>
-              <a:t>29) Climatic constants</a:t>
+              <a:t>Climatic constants</a:t>
             </a:r>
             <a:endParaRPr lang="en-GB" sz="1200" dirty="0"/>
           </a:p>
@@ -4538,7 +4538,7 @@
         </p:nvSpPr>
         <p:spPr>
           <a:xfrm>
-            <a:off x="5210176" y="5524689"/>
+            <a:off x="5210176" y="5537389"/>
             <a:ext cx="1016000" cy="426720"/>
           </a:xfrm>
           <a:prstGeom prst="rect">
@@ -4552,9 +4552,10 @@
           </a:bodyPr>
           <a:lstStyle/>
           <a:p>
+            <a:pPr algn="ctr"/>
             <a:r>
               <a:rPr lang="en-US" sz="1200" dirty="0"/>
-              <a:t>30) Function ‘</a:t>
+              <a:t>Function ‘</a:t>
             </a:r>
             <a:r>
               <a:rPr lang="en-US" sz="1200" b="1" dirty="0" err="1"/>
@@ -4595,9 +4596,10 @@
           </a:bodyPr>
           <a:lstStyle/>
           <a:p>
+            <a:pPr algn="ctr"/>
             <a:r>
               <a:rPr lang="en-US" sz="1200" dirty="0"/>
-              <a:t>31) Variability coefficients</a:t>
+              <a:t>Variability coefficients</a:t>
             </a:r>
             <a:endParaRPr lang="en-GB" sz="1200" dirty="0"/>
           </a:p>
@@ -4617,7 +4619,7 @@
         </p:nvSpPr>
         <p:spPr>
           <a:xfrm>
-            <a:off x="4027488" y="6103727"/>
+            <a:off x="4027488" y="6119602"/>
             <a:ext cx="1234598" cy="426720"/>
           </a:xfrm>
           <a:prstGeom prst="rect">
@@ -4631,9 +4633,10 @@
           </a:bodyPr>
           <a:lstStyle/>
           <a:p>
+            <a:pPr algn="ctr"/>
             <a:r>
               <a:rPr lang="en-US" sz="1200" dirty="0"/>
-              <a:t>37) Correct normal deviates</a:t>
+              <a:t>Correct normal deviates</a:t>
             </a:r>
             <a:endParaRPr lang="en-GB" sz="1200" dirty="0"/>
           </a:p>
@@ -4653,7 +4656,7 @@
         </p:nvSpPr>
         <p:spPr>
           <a:xfrm>
-            <a:off x="5209541" y="6131155"/>
+            <a:off x="5209541" y="6118455"/>
             <a:ext cx="1016000" cy="426720"/>
           </a:xfrm>
           <a:prstGeom prst="rect">
@@ -4667,9 +4670,10 @@
           </a:bodyPr>
           <a:lstStyle/>
           <a:p>
+            <a:pPr algn="ctr"/>
             <a:r>
               <a:rPr lang="en-US" sz="1200" dirty="0"/>
-              <a:t>38) Resolve SDs</a:t>
+              <a:t>Resolve SDs</a:t>
             </a:r>
             <a:endParaRPr lang="en-GB" sz="1200" dirty="0"/>
           </a:p>
@@ -4689,7 +4693,7 @@
         </p:nvSpPr>
         <p:spPr>
           <a:xfrm>
-            <a:off x="6176328" y="6117705"/>
+            <a:off x="6176328" y="6120880"/>
             <a:ext cx="1120140" cy="426720"/>
           </a:xfrm>
           <a:prstGeom prst="rect">
@@ -4703,9 +4707,10 @@
           </a:bodyPr>
           <a:lstStyle/>
           <a:p>
+            <a:pPr algn="ctr"/>
             <a:r>
               <a:rPr lang="en-US" sz="1200" dirty="0"/>
-              <a:t>39) Resolve deviations</a:t>
+              <a:t>Resolve deviations</a:t>
             </a:r>
             <a:endParaRPr lang="en-GB" sz="1200" dirty="0"/>
           </a:p>
@@ -4774,8 +4779,8 @@
         </p:nvSpPr>
         <p:spPr>
           <a:xfrm>
-            <a:off x="7894399" y="5119797"/>
-            <a:ext cx="1153160" cy="426720"/>
+            <a:off x="7894399" y="5164247"/>
+            <a:ext cx="1078865" cy="426720"/>
           </a:xfrm>
           <a:prstGeom prst="rect">
             <a:avLst/>
@@ -4788,9 +4793,10 @@
           </a:bodyPr>
           <a:lstStyle/>
           <a:p>
+            <a:pPr algn="ctr"/>
             <a:r>
               <a:rPr lang="en-US" sz="1200" dirty="0"/>
-              <a:t>32) Climatic coefficients</a:t>
+              <a:t>Climatic coefficients</a:t>
             </a:r>
             <a:endParaRPr lang="en-GB" sz="1200" dirty="0"/>
           </a:p>
@@ -4810,8 +4816,8 @@
         </p:nvSpPr>
         <p:spPr>
           <a:xfrm>
-            <a:off x="8754826" y="5136226"/>
-            <a:ext cx="1365248" cy="426720"/>
+            <a:off x="8973264" y="5167976"/>
+            <a:ext cx="1069658" cy="426720"/>
           </a:xfrm>
           <a:prstGeom prst="rect">
             <a:avLst/>
@@ -4824,9 +4830,10 @@
           </a:bodyPr>
           <a:lstStyle/>
           <a:p>
+            <a:pPr algn="ctr"/>
             <a:r>
               <a:rPr lang="en-US" sz="1200" dirty="0"/>
-              <a:t>33) Coefficient mode of variability</a:t>
+              <a:t>Coefficient mode of variability</a:t>
             </a:r>
             <a:endParaRPr lang="en-GB" sz="1200" dirty="0"/>
           </a:p>
@@ -4846,8 +4853,8 @@
         </p:nvSpPr>
         <p:spPr>
           <a:xfrm>
-            <a:off x="7894399" y="5617018"/>
-            <a:ext cx="1153160" cy="426720"/>
+            <a:off x="7895432" y="5723889"/>
+            <a:ext cx="1078865" cy="426720"/>
           </a:xfrm>
           <a:prstGeom prst="rect">
             <a:avLst/>
@@ -4860,9 +4867,10 @@
           </a:bodyPr>
           <a:lstStyle/>
           <a:p>
+            <a:pPr algn="ctr"/>
             <a:r>
               <a:rPr lang="en-US" sz="1200" dirty="0"/>
-              <a:t>34) Frequency coefficients</a:t>
+              <a:t>Frequency coefficients</a:t>
             </a:r>
             <a:endParaRPr lang="en-GB" sz="1200" dirty="0"/>
           </a:p>
@@ -4882,8 +4890,8 @@
         </p:nvSpPr>
         <p:spPr>
           <a:xfrm>
-            <a:off x="8972629" y="5633447"/>
-            <a:ext cx="1153160" cy="426720"/>
+            <a:off x="8979694" y="5727618"/>
+            <a:ext cx="1069658" cy="426720"/>
           </a:xfrm>
           <a:prstGeom prst="rect">
             <a:avLst/>
@@ -4896,9 +4904,10 @@
           </a:bodyPr>
           <a:lstStyle/>
           <a:p>
+            <a:pPr algn="ctr"/>
             <a:r>
               <a:rPr lang="en-US" sz="1200" dirty="0"/>
-              <a:t>35) System coefficients</a:t>
+              <a:t>System coefficients</a:t>
             </a:r>
             <a:endParaRPr lang="en-GB" sz="1200" dirty="0"/>
           </a:p>
@@ -4967,7 +4976,7 @@
         </p:nvSpPr>
         <p:spPr>
           <a:xfrm>
-            <a:off x="8366839" y="6132872"/>
+            <a:off x="8394779" y="6185642"/>
             <a:ext cx="1153160" cy="426720"/>
           </a:xfrm>
           <a:prstGeom prst="rect">
@@ -4981,9 +4990,10 @@
           </a:bodyPr>
           <a:lstStyle/>
           <a:p>
+            <a:pPr algn="ctr"/>
             <a:r>
               <a:rPr lang="en-US" sz="1200" dirty="0"/>
-              <a:t>36) Distance coefficients</a:t>
+              <a:t>Distance coefficients</a:t>
             </a:r>
             <a:endParaRPr lang="en-GB" sz="1200" dirty="0"/>
           </a:p>
@@ -5019,10 +5029,6 @@
           <a:p>
             <a:pPr algn="ctr"/>
             <a:r>
-              <a:rPr lang="en-US" sz="1200" dirty="0"/>
-              <a:t>41) </a:t>
-            </a:r>
-            <a:r>
               <a:rPr lang="en-US" sz="1200" b="1" dirty="0" err="1"/>
               <a:t>qlrps</a:t>
             </a:r>
@@ -5061,7 +5067,7 @@
             <a:pPr algn="ctr"/>
             <a:r>
               <a:rPr lang="en-US" sz="1200" dirty="0"/>
-              <a:t>42) </a:t>
+              <a:t> </a:t>
             </a:r>
             <a:r>
               <a:rPr lang="en-US" sz="1200" b="1" dirty="0" err="1"/>
@@ -5101,10 +5107,6 @@
           <a:p>
             <a:pPr algn="ctr"/>
             <a:r>
-              <a:rPr lang="en-US" sz="1200" dirty="0"/>
-              <a:t>43) </a:t>
-            </a:r>
-            <a:r>
               <a:rPr lang="en-US" sz="1200" b="1" dirty="0" err="1"/>
               <a:t>qlrpfl</a:t>
             </a:r>
@@ -5126,8 +5128,8 @@
         </p:nvSpPr>
         <p:spPr>
           <a:xfrm>
-            <a:off x="473372" y="2077195"/>
-            <a:ext cx="1320482" cy="426720"/>
+            <a:off x="472796" y="2555501"/>
+            <a:ext cx="1241623" cy="426720"/>
           </a:xfrm>
           <a:prstGeom prst="rect">
             <a:avLst/>
@@ -5140,10 +5142,7 @@
           </a:bodyPr>
           <a:lstStyle/>
           <a:p>
-            <a:r>
-              <a:rPr lang="en-US" sz="1200" dirty="0"/>
-              <a:t>46) </a:t>
-            </a:r>
+            <a:pPr algn="ctr"/>
             <a:r>
               <a:rPr lang="en-US" sz="1200" dirty="0" err="1"/>
               <a:t>Transhorizon</a:t>
@@ -5178,7 +5177,7 @@
         </p:nvSpPr>
         <p:spPr>
           <a:xfrm>
-            <a:off x="473272" y="1497902"/>
+            <a:off x="469025" y="1937994"/>
             <a:ext cx="1227554" cy="426720"/>
           </a:xfrm>
           <a:prstGeom prst="rect">
@@ -5192,9 +5191,10 @@
           </a:bodyPr>
           <a:lstStyle/>
           <a:p>
+            <a:pPr algn="ctr"/>
             <a:r>
               <a:rPr lang="en-US" sz="1200" dirty="0"/>
-              <a:t>45) Redo LOS horizons (</a:t>
+              <a:t>Redo LOS horizons (</a:t>
             </a:r>
             <a:r>
               <a:rPr lang="en-US" sz="1200" b="1" dirty="0"/>
@@ -5222,8 +5222,8 @@
         </p:nvSpPr>
         <p:spPr>
           <a:xfrm>
-            <a:off x="473372" y="1053818"/>
-            <a:ext cx="1119187" cy="426720"/>
+            <a:off x="473474" y="1092076"/>
+            <a:ext cx="1223665" cy="838001"/>
           </a:xfrm>
           <a:prstGeom prst="rect">
             <a:avLst/>
@@ -5236,15 +5236,28 @@
           </a:bodyPr>
           <a:lstStyle/>
           <a:p>
-            <a:r>
-              <a:rPr lang="en-US" sz="1200" dirty="0"/>
-              <a:t>44/47) </a:t>
-            </a:r>
+            <a:pPr algn="ctr"/>
             <a:r>
               <a:rPr lang="en-US" sz="1200" b="1" dirty="0" err="1"/>
               <a:t>hzns</a:t>
             </a:r>
-            <a:endParaRPr lang="en-GB" sz="1200" b="1" dirty="0"/>
+            <a:r>
+              <a:rPr lang="en-US" sz="1200" b="1" dirty="0"/>
+              <a:t>: </a:t>
+            </a:r>
+            <a:r>
+              <a:rPr lang="en-US" sz="1200" dirty="0"/>
+              <a:t>Compute distance to horizon for </a:t>
+            </a:r>
+            <a:r>
+              <a:rPr lang="en-US" sz="1200" dirty="0" err="1"/>
+              <a:t>Tx</a:t>
+            </a:r>
+            <a:r>
+              <a:rPr lang="en-US" sz="1200" dirty="0"/>
+              <a:t> an Rx</a:t>
+            </a:r>
+            <a:endParaRPr lang="en-GB" sz="1200" dirty="0"/>
           </a:p>
         </p:txBody>
       </p:sp>
@@ -5262,8 +5275,8 @@
         </p:nvSpPr>
         <p:spPr>
           <a:xfrm>
-            <a:off x="473372" y="2544942"/>
-            <a:ext cx="1062037" cy="426720"/>
+            <a:off x="462576" y="3193655"/>
+            <a:ext cx="1232119" cy="426720"/>
           </a:xfrm>
           <a:prstGeom prst="rect">
             <a:avLst/>
@@ -5276,10 +5289,7 @@
           </a:bodyPr>
           <a:lstStyle/>
           <a:p>
-            <a:r>
-              <a:rPr lang="en-US" sz="1200" dirty="0"/>
-              <a:t>48) </a:t>
-            </a:r>
+            <a:pPr algn="ctr"/>
             <a:r>
               <a:rPr lang="el-GR" sz="1200" dirty="0"/>
               <a:t>Δ</a:t>
@@ -5311,7 +5321,7 @@
         <p:spPr>
           <a:xfrm>
             <a:off x="473372" y="1053818"/>
-            <a:ext cx="1227554" cy="1901797"/>
+            <a:ext cx="1227554" cy="2560505"/>
           </a:xfrm>
           <a:prstGeom prst="rect">
             <a:avLst/>
@@ -5359,8 +5369,8 @@
         </p:nvSpPr>
         <p:spPr>
           <a:xfrm>
-            <a:off x="894955" y="6146291"/>
-            <a:ext cx="1011236" cy="426720"/>
+            <a:off x="857407" y="6146291"/>
+            <a:ext cx="916382" cy="426720"/>
           </a:xfrm>
           <a:prstGeom prst="rect">
             <a:avLst/>
@@ -5373,10 +5383,7 @@
           </a:bodyPr>
           <a:lstStyle/>
           <a:p>
-            <a:r>
-              <a:rPr lang="en-US" sz="1200" dirty="0"/>
-              <a:t>50) </a:t>
-            </a:r>
+            <a:pPr algn="ctr"/>
             <a:r>
               <a:rPr lang="en-US" sz="1200" b="1" dirty="0" err="1"/>
               <a:t>qerf</a:t>
@@ -5399,8 +5406,8 @@
         </p:nvSpPr>
         <p:spPr>
           <a:xfrm>
-            <a:off x="1617585" y="5713519"/>
-            <a:ext cx="1073150" cy="426720"/>
+            <a:off x="1679170" y="5713519"/>
+            <a:ext cx="777242" cy="426720"/>
           </a:xfrm>
           <a:prstGeom prst="rect">
             <a:avLst/>
@@ -5413,10 +5420,7 @@
           </a:bodyPr>
           <a:lstStyle/>
           <a:p>
-            <a:r>
-              <a:rPr lang="en-US" sz="1200" dirty="0"/>
-              <a:t>53) </a:t>
-            </a:r>
+            <a:pPr algn="ctr"/>
             <a:r>
               <a:rPr lang="en-US" sz="1200" b="1" dirty="0"/>
               <a:t>zlsq1</a:t>
@@ -5439,8 +5443,8 @@
         </p:nvSpPr>
         <p:spPr>
           <a:xfrm>
-            <a:off x="906385" y="5695919"/>
-            <a:ext cx="838200" cy="426720"/>
+            <a:off x="855268" y="5695919"/>
+            <a:ext cx="916382" cy="426720"/>
           </a:xfrm>
           <a:prstGeom prst="rect">
             <a:avLst/>
@@ -5453,10 +5457,7 @@
           </a:bodyPr>
           <a:lstStyle/>
           <a:p>
-            <a:r>
-              <a:rPr lang="en-US" sz="1200" dirty="0"/>
-              <a:t>52) </a:t>
-            </a:r>
+            <a:pPr algn="ctr"/>
             <a:r>
               <a:rPr lang="en-US" sz="1200" b="1" dirty="0" err="1"/>
               <a:t>qtile</a:t>
@@ -5479,8 +5480,8 @@
         </p:nvSpPr>
         <p:spPr>
           <a:xfrm>
-            <a:off x="1586470" y="6146291"/>
-            <a:ext cx="925830" cy="426720"/>
+            <a:off x="1685915" y="6146291"/>
+            <a:ext cx="770495" cy="426720"/>
           </a:xfrm>
           <a:prstGeom prst="rect">
             <a:avLst/>
@@ -5493,10 +5494,7 @@
           </a:bodyPr>
           <a:lstStyle/>
           <a:p>
-            <a:r>
-              <a:rPr lang="en-US" sz="1200" dirty="0"/>
-              <a:t>51) </a:t>
-            </a:r>
+            <a:pPr algn="ctr"/>
             <a:r>
               <a:rPr lang="en-US" sz="1200" b="1" dirty="0" err="1"/>
               <a:t>qerfi</a:t>
@@ -5614,7 +5612,7 @@
         </p:nvCxnSpPr>
         <p:spPr>
           <a:xfrm flipH="1">
-            <a:off x="6535261" y="1335549"/>
+            <a:off x="6535261" y="1345488"/>
             <a:ext cx="3228182" cy="1512983"/>
           </a:xfrm>
           <a:prstGeom prst="straightConnector1">
@@ -5944,14 +5942,15 @@
             </a:extLst>
           </p:cNvPr>
           <p:cNvCxnSpPr>
+            <a:cxnSpLocks/>
             <a:stCxn id="10" idx="1"/>
           </p:cNvCxnSpPr>
           <p:nvPr/>
         </p:nvCxnSpPr>
         <p:spPr>
           <a:xfrm flipH="1">
-            <a:off x="4506593" y="1155090"/>
-            <a:ext cx="264796" cy="7806"/>
+            <a:off x="4644787" y="1180911"/>
+            <a:ext cx="280534" cy="0"/>
           </a:xfrm>
           <a:prstGeom prst="straightConnector1">
             <a:avLst/>
@@ -6149,7 +6148,7 @@
             <a:pPr algn="ctr"/>
             <a:r>
               <a:rPr lang="en-US" sz="1200" i="1" dirty="0"/>
-              <a:t>‘The Statistics’</a:t>
+              <a:t>Statistics</a:t>
             </a:r>
             <a:endParaRPr lang="en-GB" sz="1200" i="1" dirty="0"/>
           </a:p>
@@ -6335,7 +6334,7 @@
         </p:nvSpPr>
         <p:spPr>
           <a:xfrm>
-            <a:off x="2438432" y="1614820"/>
+            <a:off x="2378438" y="1622648"/>
             <a:ext cx="423514" cy="276999"/>
           </a:xfrm>
           <a:prstGeom prst="rect">
@@ -6348,6 +6347,7 @@
           </a:bodyPr>
           <a:lstStyle/>
           <a:p>
+            <a:pPr algn="ctr"/>
             <a:r>
               <a:rPr lang="en-US" sz="1200" i="1" dirty="0"/>
               <a:t>P2P</a:t>
@@ -6403,14 +6403,13 @@
           <p:cNvCxnSpPr>
             <a:cxnSpLocks/>
             <a:stCxn id="61" idx="3"/>
-            <a:endCxn id="56" idx="1"/>
           </p:cNvCxnSpPr>
           <p:nvPr/>
         </p:nvCxnSpPr>
         <p:spPr>
           <a:xfrm flipV="1">
-            <a:off x="1700926" y="2000526"/>
-            <a:ext cx="470933" cy="4191"/>
+            <a:off x="1700926" y="2114562"/>
+            <a:ext cx="626638" cy="219509"/>
           </a:xfrm>
           <a:prstGeom prst="straightConnector1">
             <a:avLst/>

</xml_diff>